<commit_message>
Upload new EditFeature Image
</commit_message>
<xml_diff>
--- a/docs/Edit.pptx
+++ b/docs/Edit.pptx
@@ -209,7 +209,7 @@
           <a:p>
             <a:fld id="{9629A0FB-7277-41B0-BEC2-EE35F8B0CE39}" type="datetimeFigureOut">
               <a:rPr lang="en-SG" smtClean="0"/>
-              <a:t>23/3/2020</a:t>
+              <a:t>2/4/2020</a:t>
             </a:fld>
             <a:endParaRPr lang="en-SG"/>
           </a:p>
@@ -3835,10 +3835,10 @@
         </p:nvGrpSpPr>
         <p:grpSpPr>
           <a:xfrm>
-            <a:off x="228600" y="609601"/>
-            <a:ext cx="8610600" cy="5410200"/>
+            <a:off x="228600" y="172946"/>
+            <a:ext cx="8469191" cy="6423218"/>
             <a:chOff x="117858" y="197507"/>
-            <a:chExt cx="8554514" cy="6420490"/>
+            <a:chExt cx="8414026" cy="7622675"/>
           </a:xfrm>
         </p:grpSpPr>
         <p:sp>
@@ -3850,9 +3850,9 @@
             <p:nvPr/>
           </p:nvSpPr>
           <p:spPr bwMode="auto">
-            <a:xfrm>
-              <a:off x="728768" y="839832"/>
-              <a:ext cx="10115" cy="3904336"/>
+            <a:xfrm flipH="1">
+              <a:off x="717650" y="839833"/>
+              <a:ext cx="11119" cy="6567646"/>
             </a:xfrm>
             <a:prstGeom prst="line">
               <a:avLst/>
@@ -3975,7 +3975,7 @@
           <p:spPr>
             <a:xfrm>
               <a:off x="603890" y="1120110"/>
-              <a:ext cx="225619" cy="3348432"/>
+              <a:ext cx="229013" cy="6130890"/>
             </a:xfrm>
             <a:prstGeom prst="rect">
               <a:avLst/>
@@ -4032,7 +4032,7 @@
           </p:nvSpPr>
           <p:spPr bwMode="auto">
             <a:xfrm>
-              <a:off x="4822622" y="2211422"/>
+              <a:off x="4811485" y="2871882"/>
               <a:ext cx="1596653" cy="600164"/>
             </a:xfrm>
             <a:prstGeom prst="rect">
@@ -4103,9 +4103,9 @@
             <p:nvPr/>
           </p:nvSpPr>
           <p:spPr bwMode="auto">
-            <a:xfrm flipH="1">
-              <a:off x="3018095" y="1536671"/>
-              <a:ext cx="8589" cy="1590924"/>
+            <a:xfrm>
+              <a:off x="3026682" y="1536671"/>
+              <a:ext cx="2699" cy="3248802"/>
             </a:xfrm>
             <a:prstGeom prst="line">
               <a:avLst/>
@@ -4197,7 +4197,7 @@
           </p:nvSpPr>
           <p:spPr bwMode="auto">
             <a:xfrm>
-              <a:off x="6061453" y="3443284"/>
+              <a:off x="6126015" y="4946607"/>
               <a:ext cx="1584515" cy="323165"/>
             </a:xfrm>
             <a:prstGeom prst="rect">
@@ -4245,7 +4245,7 @@
           </p:nvSpPr>
           <p:spPr bwMode="auto">
             <a:xfrm flipV="1">
-              <a:off x="3194466" y="2531036"/>
+              <a:off x="3194466" y="3173731"/>
               <a:ext cx="1628156" cy="7946"/>
             </a:xfrm>
             <a:prstGeom prst="line">
@@ -4286,7 +4286,7 @@
           </p:nvSpPr>
           <p:spPr bwMode="auto">
             <a:xfrm>
-              <a:off x="808004" y="1719683"/>
+              <a:off x="808004" y="2632475"/>
               <a:ext cx="2500554" cy="323165"/>
             </a:xfrm>
             <a:prstGeom prst="rect">
@@ -4342,7 +4342,7 @@
           </p:nvSpPr>
           <p:spPr bwMode="auto">
             <a:xfrm>
-              <a:off x="965943" y="2367812"/>
+              <a:off x="965943" y="3622404"/>
               <a:ext cx="1710047" cy="553998"/>
             </a:xfrm>
             <a:prstGeom prst="rect">
@@ -4383,60 +4383,6 @@
         </p:sp>
         <p:sp>
           <p:nvSpPr>
-            <p:cNvPr id="33" name="Line 13"/>
-            <p:cNvSpPr>
-              <a:spLocks noChangeShapeType="1"/>
-            </p:cNvSpPr>
-            <p:nvPr/>
-          </p:nvSpPr>
-          <p:spPr bwMode="auto">
-            <a:xfrm flipH="1">
-              <a:off x="5593778" y="2795355"/>
-              <a:ext cx="11119" cy="2835500"/>
-            </a:xfrm>
-            <a:prstGeom prst="line">
-              <a:avLst/>
-            </a:prstGeom>
-            <a:ln>
-              <a:solidFill>
-                <a:schemeClr val="accent3">
-                  <a:lumMod val="75000"/>
-                </a:schemeClr>
-              </a:solidFill>
-              <a:prstDash val="sysDash"/>
-              <a:headEnd/>
-              <a:tailEnd/>
-            </a:ln>
-          </p:spPr>
-          <p:style>
-            <a:lnRef idx="2">
-              <a:schemeClr val="accent4"/>
-            </a:lnRef>
-            <a:fillRef idx="0">
-              <a:schemeClr val="accent4"/>
-            </a:fillRef>
-            <a:effectRef idx="1">
-              <a:schemeClr val="accent4"/>
-            </a:effectRef>
-            <a:fontRef idx="minor">
-              <a:schemeClr val="tx1"/>
-            </a:fontRef>
-          </p:style>
-          <p:txBody>
-            <a:bodyPr/>
-            <a:lstStyle/>
-            <a:p>
-              <a:pPr defTabSz="872733"/>
-              <a:endParaRPr lang="en-US" sz="1500">
-                <a:solidFill>
-                  <a:prstClr val="black"/>
-                </a:solidFill>
-              </a:endParaRPr>
-            </a:p>
-          </p:txBody>
-        </p:sp>
-        <p:sp>
-          <p:nvSpPr>
             <p:cNvPr id="34" name="Line 15"/>
             <p:cNvSpPr>
               <a:spLocks noChangeShapeType="1"/>
@@ -4445,7 +4391,7 @@
           </p:nvSpPr>
           <p:spPr bwMode="auto">
             <a:xfrm flipV="1">
-              <a:off x="863760" y="2095125"/>
+              <a:off x="863760" y="3007916"/>
               <a:ext cx="2040971" cy="1"/>
             </a:xfrm>
             <a:prstGeom prst="line">
@@ -4520,14 +4466,68 @@
         </p:sp>
         <p:sp>
           <p:nvSpPr>
+            <p:cNvPr id="33" name="Line 13"/>
+            <p:cNvSpPr>
+              <a:spLocks noChangeShapeType="1"/>
+            </p:cNvSpPr>
+            <p:nvPr/>
+          </p:nvSpPr>
+          <p:spPr bwMode="auto">
+            <a:xfrm flipH="1">
+              <a:off x="5583867" y="3990671"/>
+              <a:ext cx="12611" cy="3584793"/>
+            </a:xfrm>
+            <a:prstGeom prst="line">
+              <a:avLst/>
+            </a:prstGeom>
+            <a:ln>
+              <a:solidFill>
+                <a:schemeClr val="accent3">
+                  <a:lumMod val="75000"/>
+                </a:schemeClr>
+              </a:solidFill>
+              <a:prstDash val="sysDash"/>
+              <a:headEnd/>
+              <a:tailEnd/>
+            </a:ln>
+          </p:spPr>
+          <p:style>
+            <a:lnRef idx="2">
+              <a:schemeClr val="accent4"/>
+            </a:lnRef>
+            <a:fillRef idx="0">
+              <a:schemeClr val="accent4"/>
+            </a:fillRef>
+            <a:effectRef idx="1">
+              <a:schemeClr val="accent4"/>
+            </a:effectRef>
+            <a:fontRef idx="minor">
+              <a:schemeClr val="tx1"/>
+            </a:fontRef>
+          </p:style>
+          <p:txBody>
+            <a:bodyPr/>
+            <a:lstStyle/>
+            <a:p>
+              <a:pPr defTabSz="872733"/>
+              <a:endParaRPr lang="en-US" sz="1500">
+                <a:solidFill>
+                  <a:prstClr val="black"/>
+                </a:solidFill>
+              </a:endParaRPr>
+            </a:p>
+          </p:txBody>
+        </p:sp>
+        <p:sp>
+          <p:nvSpPr>
             <p:cNvPr id="40" name="Rectangle 39"/>
             <p:cNvSpPr/>
             <p:nvPr/>
           </p:nvSpPr>
           <p:spPr>
             <a:xfrm>
-              <a:off x="5474656" y="3465195"/>
-              <a:ext cx="321233" cy="1716405"/>
+              <a:off x="5460881" y="3493320"/>
+              <a:ext cx="321233" cy="531758"/>
             </a:xfrm>
             <a:prstGeom prst="rect">
               <a:avLst/>
@@ -4589,7 +4589,7 @@
           </p:nvSpPr>
           <p:spPr bwMode="auto">
             <a:xfrm>
-              <a:off x="6995972" y="2511504"/>
+              <a:off x="6855484" y="2511504"/>
               <a:ext cx="1676400" cy="600164"/>
             </a:xfrm>
             <a:prstGeom prst="rect">
@@ -4744,8 +4744,8 @@
           </p:nvSpPr>
           <p:spPr>
             <a:xfrm>
-              <a:off x="2888219" y="2097347"/>
-              <a:ext cx="286905" cy="893938"/>
+              <a:off x="2918894" y="3010139"/>
+              <a:ext cx="286905" cy="1268640"/>
             </a:xfrm>
             <a:prstGeom prst="rect">
               <a:avLst/>
@@ -4806,9 +4806,9 @@
             <p:nvPr/>
           </p:nvSpPr>
           <p:spPr bwMode="auto">
-            <a:xfrm flipV="1">
-              <a:off x="875317" y="3457250"/>
-              <a:ext cx="4588585" cy="7945"/>
+            <a:xfrm>
+              <a:off x="852246" y="5138794"/>
+              <a:ext cx="4579394" cy="7948"/>
             </a:xfrm>
             <a:prstGeom prst="line">
               <a:avLst/>
@@ -4830,7 +4830,7 @@
             <a:lstStyle/>
             <a:p>
               <a:pPr defTabSz="872733"/>
-              <a:endParaRPr lang="en-US" sz="1500">
+              <a:endParaRPr lang="en-US" sz="1500" dirty="0">
                 <a:solidFill>
                   <a:prstClr val="black"/>
                 </a:solidFill>
@@ -4854,8 +4854,8 @@
           </p:nvSpPr>
           <p:spPr bwMode="auto">
             <a:xfrm>
-              <a:off x="5801997" y="3766449"/>
-              <a:ext cx="1970403" cy="11401"/>
+              <a:off x="5817398" y="5327601"/>
+              <a:ext cx="1851768" cy="15527"/>
             </a:xfrm>
             <a:prstGeom prst="line">
               <a:avLst/>
@@ -4901,8 +4901,8 @@
           </p:nvSpPr>
           <p:spPr bwMode="auto">
             <a:xfrm>
-              <a:off x="3174259" y="2225671"/>
-              <a:ext cx="2129261" cy="329063"/>
+              <a:off x="3250755" y="2827088"/>
+              <a:ext cx="1412001" cy="383512"/>
             </a:xfrm>
             <a:prstGeom prst="rect">
               <a:avLst/>
@@ -4955,7 +4955,7 @@
           </p:nvSpPr>
           <p:spPr bwMode="auto">
             <a:xfrm flipH="1">
-              <a:off x="852246" y="2972051"/>
+              <a:off x="852246" y="4258886"/>
               <a:ext cx="2016629" cy="7945"/>
             </a:xfrm>
             <a:prstGeom prst="line">
@@ -4985,92 +4985,6 @@
             </a:p>
           </p:txBody>
         </p:sp>
-        <p:cxnSp>
-          <p:nvCxnSpPr>
-            <p:cNvPr id="49" name="Straight Connector 48">
-              <a:extLst>
-                <a:ext uri="{FF2B5EF4-FFF2-40B4-BE49-F238E27FC236}">
-                  <a16:creationId xmlns:a16="http://schemas.microsoft.com/office/drawing/2014/main" id="{054EC965-613F-450A-BDA7-4AEF688EE06E}"/>
-                </a:ext>
-              </a:extLst>
-            </p:cNvPr>
-            <p:cNvCxnSpPr/>
-            <p:nvPr/>
-          </p:nvCxnSpPr>
-          <p:spPr>
-            <a:xfrm rot="16200000" flipV="1">
-              <a:off x="2879243" y="3078093"/>
-              <a:ext cx="284430" cy="267655"/>
-            </a:xfrm>
-            <a:prstGeom prst="line">
-              <a:avLst/>
-            </a:prstGeom>
-            <a:ln w="19050">
-              <a:solidFill>
-                <a:schemeClr val="accent4">
-                  <a:lumMod val="75000"/>
-                </a:schemeClr>
-              </a:solidFill>
-            </a:ln>
-          </p:spPr>
-          <p:style>
-            <a:lnRef idx="1">
-              <a:schemeClr val="accent1"/>
-            </a:lnRef>
-            <a:fillRef idx="0">
-              <a:schemeClr val="accent1"/>
-            </a:fillRef>
-            <a:effectRef idx="0">
-              <a:schemeClr val="accent1"/>
-            </a:effectRef>
-            <a:fontRef idx="minor">
-              <a:schemeClr val="tx1"/>
-            </a:fontRef>
-          </p:style>
-        </p:cxnSp>
-        <p:cxnSp>
-          <p:nvCxnSpPr>
-            <p:cNvPr id="50" name="Straight Connector 49">
-              <a:extLst>
-                <a:ext uri="{FF2B5EF4-FFF2-40B4-BE49-F238E27FC236}">
-                  <a16:creationId xmlns:a16="http://schemas.microsoft.com/office/drawing/2014/main" id="{BCC52252-11B3-4A56-A114-AE5F1D9A8E9B}"/>
-                </a:ext>
-              </a:extLst>
-            </p:cNvPr>
-            <p:cNvCxnSpPr/>
-            <p:nvPr/>
-          </p:nvCxnSpPr>
-          <p:spPr>
-            <a:xfrm rot="5400000">
-              <a:off x="2872653" y="3082587"/>
-              <a:ext cx="288175" cy="266007"/>
-            </a:xfrm>
-            <a:prstGeom prst="line">
-              <a:avLst/>
-            </a:prstGeom>
-            <a:ln w="19050">
-              <a:solidFill>
-                <a:schemeClr val="accent4">
-                  <a:lumMod val="75000"/>
-                </a:schemeClr>
-              </a:solidFill>
-            </a:ln>
-          </p:spPr>
-          <p:style>
-            <a:lnRef idx="1">
-              <a:schemeClr val="accent1"/>
-            </a:lnRef>
-            <a:fillRef idx="0">
-              <a:schemeClr val="accent1"/>
-            </a:fillRef>
-            <a:effectRef idx="0">
-              <a:schemeClr val="accent1"/>
-            </a:effectRef>
-            <a:fontRef idx="minor">
-              <a:schemeClr val="tx1"/>
-            </a:fontRef>
-          </p:style>
-        </p:cxnSp>
         <p:sp>
           <p:nvSpPr>
             <p:cNvPr id="51" name="Text Box 25">
@@ -5087,7 +5001,7 @@
           </p:nvSpPr>
           <p:spPr bwMode="auto">
             <a:xfrm>
-              <a:off x="3799306" y="3091248"/>
+              <a:off x="3848873" y="4785024"/>
               <a:ext cx="886908" cy="323165"/>
             </a:xfrm>
             <a:prstGeom prst="rect">
@@ -5136,9 +5050,9 @@
             <p:nvPr/>
           </p:nvSpPr>
           <p:spPr bwMode="auto">
-            <a:xfrm>
-              <a:off x="7827642" y="3139118"/>
-              <a:ext cx="43793" cy="3478879"/>
+            <a:xfrm flipH="1">
+              <a:off x="7820170" y="3139120"/>
+              <a:ext cx="7470" cy="4681062"/>
             </a:xfrm>
             <a:prstGeom prst="line">
               <a:avLst/>
@@ -5195,8 +5109,8 @@
           </p:nvSpPr>
           <p:spPr>
             <a:xfrm>
-              <a:off x="7749639" y="3766447"/>
-              <a:ext cx="251361" cy="1864407"/>
+              <a:off x="7688224" y="5327602"/>
+              <a:ext cx="281273" cy="1388474"/>
             </a:xfrm>
             <a:prstGeom prst="rect">
               <a:avLst/>
@@ -5255,7 +5169,7 @@
           </p:nvCxnSpPr>
           <p:spPr>
             <a:xfrm rot="16200000" flipV="1">
-              <a:off x="5459408" y="5597682"/>
+              <a:off x="5443887" y="7487609"/>
               <a:ext cx="284430" cy="267655"/>
             </a:xfrm>
             <a:prstGeom prst="line">
@@ -5298,8 +5212,8 @@
           </p:nvCxnSpPr>
           <p:spPr>
             <a:xfrm rot="5400000">
-              <a:off x="5452818" y="5602176"/>
-              <a:ext cx="288175" cy="266007"/>
+              <a:off x="5437298" y="7492103"/>
+              <a:ext cx="288176" cy="266007"/>
             </a:xfrm>
             <a:prstGeom prst="line">
               <a:avLst/>
@@ -5343,8 +5257,8 @@
           </p:nvSpPr>
           <p:spPr bwMode="auto">
             <a:xfrm flipH="1" flipV="1">
-              <a:off x="5806643" y="4042808"/>
-              <a:ext cx="1936888" cy="11401"/>
+              <a:off x="5792157" y="5668257"/>
+              <a:ext cx="1918374" cy="19721"/>
             </a:xfrm>
             <a:prstGeom prst="line">
               <a:avLst/>
@@ -5375,12 +5289,287 @@
             </a:p>
           </p:txBody>
         </p:sp>
+      </p:grpSp>
+      <p:sp>
+        <p:nvSpPr>
+          <p:cNvPr id="61" name="Rectangle 60">
+            <a:extLst>
+              <a:ext uri="{FF2B5EF4-FFF2-40B4-BE49-F238E27FC236}">
+                <a16:creationId xmlns:a16="http://schemas.microsoft.com/office/drawing/2014/main" id="{88A51D3B-623E-4A04-8E2A-68F62F9AC7CD}"/>
+              </a:ext>
+            </a:extLst>
+          </p:cNvPr>
+          <p:cNvSpPr/>
+          <p:nvPr/>
+        </p:nvSpPr>
+        <p:spPr>
+          <a:xfrm>
+            <a:off x="5606100" y="4343400"/>
+            <a:ext cx="323339" cy="1905002"/>
+          </a:xfrm>
+          <a:prstGeom prst="rect">
+            <a:avLst/>
+          </a:prstGeom>
+          <a:solidFill>
+            <a:schemeClr val="accent3">
+              <a:lumMod val="20000"/>
+              <a:lumOff val="80000"/>
+            </a:schemeClr>
+          </a:solidFill>
+          <a:ln>
+            <a:solidFill>
+              <a:schemeClr val="accent3">
+                <a:lumMod val="75000"/>
+              </a:schemeClr>
+            </a:solidFill>
+          </a:ln>
+        </p:spPr>
+        <p:style>
+          <a:lnRef idx="2">
+            <a:schemeClr val="accent4"/>
+          </a:lnRef>
+          <a:fillRef idx="1">
+            <a:schemeClr val="lt1"/>
+          </a:fillRef>
+          <a:effectRef idx="0">
+            <a:schemeClr val="accent4"/>
+          </a:effectRef>
+          <a:fontRef idx="minor">
+            <a:schemeClr val="dk1"/>
+          </a:fontRef>
+        </p:style>
+        <p:txBody>
+          <a:bodyPr rtlCol="0" anchor="ctr"/>
+          <a:lstStyle/>
+          <a:p>
+            <a:pPr algn="ctr" defTabSz="872733"/>
+            <a:endParaRPr lang="en-US" sz="1500">
+              <a:solidFill>
+                <a:prstClr val="black"/>
+              </a:solidFill>
+            </a:endParaRPr>
+          </a:p>
+        </p:txBody>
+      </p:sp>
+      <p:cxnSp>
+        <p:nvCxnSpPr>
+          <p:cNvPr id="36" name="Straight Connector 35">
+            <a:extLst>
+              <a:ext uri="{FF2B5EF4-FFF2-40B4-BE49-F238E27FC236}">
+                <a16:creationId xmlns:a16="http://schemas.microsoft.com/office/drawing/2014/main" id="{AA1C11BE-E98D-442A-9508-8D184D263297}"/>
+              </a:ext>
+            </a:extLst>
+          </p:cNvPr>
+          <p:cNvCxnSpPr/>
+          <p:nvPr/>
+        </p:nvCxnSpPr>
+        <p:spPr>
+          <a:xfrm rot="16200000" flipV="1">
+            <a:off x="3022058" y="3922154"/>
+            <a:ext cx="239674" cy="269410"/>
+          </a:xfrm>
+          <a:prstGeom prst="line">
+            <a:avLst/>
+          </a:prstGeom>
+          <a:ln w="19050">
+            <a:solidFill>
+              <a:schemeClr val="accent4">
+                <a:lumMod val="75000"/>
+              </a:schemeClr>
+            </a:solidFill>
+          </a:ln>
+        </p:spPr>
+        <p:style>
+          <a:lnRef idx="1">
+            <a:schemeClr val="accent1"/>
+          </a:lnRef>
+          <a:fillRef idx="0">
+            <a:schemeClr val="accent1"/>
+          </a:fillRef>
+          <a:effectRef idx="0">
+            <a:schemeClr val="accent1"/>
+          </a:effectRef>
+          <a:fontRef idx="minor">
+            <a:schemeClr val="tx1"/>
+          </a:fontRef>
+        </p:style>
+      </p:cxnSp>
+      <p:cxnSp>
+        <p:nvCxnSpPr>
+          <p:cNvPr id="37" name="Straight Connector 36">
+            <a:extLst>
+              <a:ext uri="{FF2B5EF4-FFF2-40B4-BE49-F238E27FC236}">
+                <a16:creationId xmlns:a16="http://schemas.microsoft.com/office/drawing/2014/main" id="{657575BD-4316-4D6C-88D2-A62A17C5DC9D}"/>
+              </a:ext>
+            </a:extLst>
+          </p:cNvPr>
+          <p:cNvCxnSpPr/>
+          <p:nvPr/>
+        </p:nvCxnSpPr>
+        <p:spPr>
+          <a:xfrm rot="5400000">
+            <a:off x="3015732" y="3926075"/>
+            <a:ext cx="242830" cy="267751"/>
+          </a:xfrm>
+          <a:prstGeom prst="line">
+            <a:avLst/>
+          </a:prstGeom>
+          <a:ln w="19050">
+            <a:solidFill>
+              <a:schemeClr val="accent4">
+                <a:lumMod val="75000"/>
+              </a:schemeClr>
+            </a:solidFill>
+          </a:ln>
+        </p:spPr>
+        <p:style>
+          <a:lnRef idx="1">
+            <a:schemeClr val="accent1"/>
+          </a:lnRef>
+          <a:fillRef idx="0">
+            <a:schemeClr val="accent1"/>
+          </a:fillRef>
+          <a:effectRef idx="0">
+            <a:schemeClr val="accent1"/>
+          </a:effectRef>
+          <a:fontRef idx="minor">
+            <a:schemeClr val="tx1"/>
+          </a:fontRef>
+        </p:style>
+      </p:cxnSp>
+      <p:sp>
+        <p:nvSpPr>
+          <p:cNvPr id="39" name="Rectangle 38">
+            <a:extLst>
+              <a:ext uri="{FF2B5EF4-FFF2-40B4-BE49-F238E27FC236}">
+                <a16:creationId xmlns:a16="http://schemas.microsoft.com/office/drawing/2014/main" id="{ACBD50A8-85E4-4947-8642-FBCB98648421}"/>
+              </a:ext>
+            </a:extLst>
+          </p:cNvPr>
+          <p:cNvSpPr/>
+          <p:nvPr/>
+        </p:nvSpPr>
+        <p:spPr>
+          <a:xfrm>
+            <a:off x="2997502" y="1295400"/>
+            <a:ext cx="288786" cy="420124"/>
+          </a:xfrm>
+          <a:prstGeom prst="rect">
+            <a:avLst/>
+          </a:prstGeom>
+          <a:solidFill>
+            <a:schemeClr val="accent4">
+              <a:lumMod val="40000"/>
+              <a:lumOff val="60000"/>
+            </a:schemeClr>
+          </a:solidFill>
+          <a:ln>
+            <a:solidFill>
+              <a:schemeClr val="accent4">
+                <a:lumMod val="75000"/>
+              </a:schemeClr>
+            </a:solidFill>
+          </a:ln>
+        </p:spPr>
+        <p:style>
+          <a:lnRef idx="2">
+            <a:schemeClr val="accent4"/>
+          </a:lnRef>
+          <a:fillRef idx="1">
+            <a:schemeClr val="lt1"/>
+          </a:fillRef>
+          <a:effectRef idx="0">
+            <a:schemeClr val="accent4"/>
+          </a:effectRef>
+          <a:fontRef idx="minor">
+            <a:schemeClr val="dk1"/>
+          </a:fontRef>
+        </p:style>
+        <p:txBody>
+          <a:bodyPr rtlCol="0" anchor="ctr"/>
+          <a:lstStyle/>
+          <a:p>
+            <a:pPr algn="ctr" defTabSz="872733"/>
+            <a:endParaRPr lang="en-US" sz="1500">
+              <a:solidFill>
+                <a:prstClr val="black"/>
+              </a:solidFill>
+            </a:endParaRPr>
+          </a:p>
+        </p:txBody>
+      </p:sp>
+      <p:sp>
+        <p:nvSpPr>
+          <p:cNvPr id="41" name="Line 16">
+            <a:extLst>
+              <a:ext uri="{FF2B5EF4-FFF2-40B4-BE49-F238E27FC236}">
+                <a16:creationId xmlns:a16="http://schemas.microsoft.com/office/drawing/2014/main" id="{13582647-41A4-4521-BBF4-5ED504308A33}"/>
+              </a:ext>
+            </a:extLst>
+          </p:cNvPr>
+          <p:cNvSpPr>
+            <a:spLocks noChangeShapeType="1"/>
+          </p:cNvSpPr>
+          <p:nvPr/>
+        </p:nvSpPr>
+        <p:spPr bwMode="auto">
+          <a:xfrm flipH="1">
+            <a:off x="939239" y="1703833"/>
+            <a:ext cx="2051088" cy="2"/>
+          </a:xfrm>
+          <a:prstGeom prst="line">
+            <a:avLst/>
+          </a:prstGeom>
+          <a:noFill/>
+          <a:ln w="19050">
+            <a:solidFill>
+              <a:schemeClr val="accent4"/>
+            </a:solidFill>
+            <a:prstDash val="sysDash"/>
+            <a:round/>
+            <a:headEnd/>
+            <a:tailEnd type="triangle" w="lg" len="lg"/>
+          </a:ln>
+        </p:spPr>
+        <p:txBody>
+          <a:bodyPr/>
+          <a:lstStyle/>
+          <a:p>
+            <a:pPr defTabSz="872733"/>
+            <a:endParaRPr lang="en-US" sz="1500">
+              <a:solidFill>
+                <a:prstClr val="black"/>
+              </a:solidFill>
+            </a:endParaRPr>
+          </a:p>
+        </p:txBody>
+      </p:sp>
+      <p:grpSp>
+        <p:nvGrpSpPr>
+          <p:cNvPr id="4" name="Group 3">
+            <a:extLst>
+              <a:ext uri="{FF2B5EF4-FFF2-40B4-BE49-F238E27FC236}">
+                <a16:creationId xmlns:a16="http://schemas.microsoft.com/office/drawing/2014/main" id="{0C728DD1-DFDC-4E29-A683-00329337F665}"/>
+              </a:ext>
+            </a:extLst>
+          </p:cNvPr>
+          <p:cNvGrpSpPr/>
+          <p:nvPr/>
+        </p:nvGrpSpPr>
+        <p:grpSpPr>
+          <a:xfrm>
+            <a:off x="5292255" y="5424110"/>
+            <a:ext cx="3562689" cy="612290"/>
+            <a:chOff x="5325541" y="911710"/>
+            <a:chExt cx="3380529" cy="601724"/>
+          </a:xfrm>
+        </p:grpSpPr>
         <p:sp>
           <p:nvSpPr>
-            <p:cNvPr id="2" name="Rectangle 1">
+            <p:cNvPr id="56" name="Rectangle 55">
               <a:extLst>
                 <a:ext uri="{FF2B5EF4-FFF2-40B4-BE49-F238E27FC236}">
-                  <a16:creationId xmlns:a16="http://schemas.microsoft.com/office/drawing/2014/main" id="{1F25EFBC-FB4D-46DF-B4EA-F7E0A817AE44}"/>
+                  <a16:creationId xmlns:a16="http://schemas.microsoft.com/office/drawing/2014/main" id="{8D2C2257-3ECD-47F4-9E03-5FE3F2C9575E}"/>
                 </a:ext>
               </a:extLst>
             </p:cNvPr>
@@ -5389,8 +5578,8 @@
           </p:nvSpPr>
           <p:spPr>
             <a:xfrm>
-              <a:off x="5181600" y="4330145"/>
-              <a:ext cx="3358510" cy="677640"/>
+              <a:off x="5325541" y="942423"/>
+              <a:ext cx="3380529" cy="571011"/>
             </a:xfrm>
             <a:prstGeom prst="rect">
               <a:avLst/>
@@ -5422,10 +5611,10 @@
         </p:sp>
         <p:sp>
           <p:nvSpPr>
-            <p:cNvPr id="8" name="Rectangle: Top Corners One Rounded and One Snipped 7">
+            <p:cNvPr id="57" name="Rectangle: Top Corners One Rounded and One Snipped 56">
               <a:extLst>
                 <a:ext uri="{FF2B5EF4-FFF2-40B4-BE49-F238E27FC236}">
-                  <a16:creationId xmlns:a16="http://schemas.microsoft.com/office/drawing/2014/main" id="{F3B05C46-E695-464D-8021-60759768F5BC}"/>
+                  <a16:creationId xmlns:a16="http://schemas.microsoft.com/office/drawing/2014/main" id="{48978760-D24A-40B1-87D7-2CA21E6EC3F1}"/>
                 </a:ext>
               </a:extLst>
             </p:cNvPr>
@@ -5434,8 +5623,8 @@
           </p:nvSpPr>
           <p:spPr>
             <a:xfrm rot="10800000" flipH="1">
-              <a:off x="5181601" y="4330372"/>
-              <a:ext cx="879852" cy="338592"/>
+              <a:off x="5325542" y="942614"/>
+              <a:ext cx="885621" cy="285313"/>
             </a:xfrm>
             <a:prstGeom prst="snipRoundRect">
               <a:avLst/>
@@ -5472,10 +5661,10 @@
         </p:sp>
         <p:sp>
           <p:nvSpPr>
-            <p:cNvPr id="10" name="TextBox 9">
+            <p:cNvPr id="58" name="TextBox 57">
               <a:extLst>
                 <a:ext uri="{FF2B5EF4-FFF2-40B4-BE49-F238E27FC236}">
-                  <a16:creationId xmlns:a16="http://schemas.microsoft.com/office/drawing/2014/main" id="{6E4CE0C6-0A24-47B5-A92B-EE9386BB611C}"/>
+                  <a16:creationId xmlns:a16="http://schemas.microsoft.com/office/drawing/2014/main" id="{BD96F86C-54E5-40F7-B7AE-2E623965D4ED}"/>
                 </a:ext>
               </a:extLst>
             </p:cNvPr>
@@ -5484,8 +5673,8 @@
           </p:nvSpPr>
           <p:spPr>
             <a:xfrm>
-              <a:off x="5359819" y="4293697"/>
-              <a:ext cx="522258" cy="646331"/>
+              <a:off x="5504929" y="911710"/>
+              <a:ext cx="525682" cy="544628"/>
             </a:xfrm>
             <a:prstGeom prst="rect">
               <a:avLst/>
@@ -5510,10 +5699,10 @@
         </p:sp>
         <p:sp>
           <p:nvSpPr>
-            <p:cNvPr id="11" name="TextBox 10">
+            <p:cNvPr id="59" name="TextBox 58">
               <a:extLst>
                 <a:ext uri="{FF2B5EF4-FFF2-40B4-BE49-F238E27FC236}">
-                  <a16:creationId xmlns:a16="http://schemas.microsoft.com/office/drawing/2014/main" id="{5B3AD932-7109-4FDC-ACCC-EE3AAA127E97}"/>
+                  <a16:creationId xmlns:a16="http://schemas.microsoft.com/office/drawing/2014/main" id="{440536AE-575F-4115-8F41-555F680D0D45}"/>
                 </a:ext>
               </a:extLst>
             </p:cNvPr>
@@ -5522,8 +5711,8 @@
           </p:nvSpPr>
           <p:spPr>
             <a:xfrm>
-              <a:off x="6050831" y="4468542"/>
-              <a:ext cx="1972720" cy="369332"/>
+              <a:off x="6200471" y="1059043"/>
+              <a:ext cx="1985654" cy="311216"/>
             </a:xfrm>
             <a:prstGeom prst="rect">
               <a:avLst/>
@@ -5544,6 +5733,54 @@
           </p:txBody>
         </p:sp>
       </p:grpSp>
+      <p:sp>
+        <p:nvSpPr>
+          <p:cNvPr id="62" name="Line 16">
+            <a:extLst>
+              <a:ext uri="{FF2B5EF4-FFF2-40B4-BE49-F238E27FC236}">
+                <a16:creationId xmlns:a16="http://schemas.microsoft.com/office/drawing/2014/main" id="{95BC985C-B3BD-4D6D-B8A0-544927B63596}"/>
+              </a:ext>
+            </a:extLst>
+          </p:cNvPr>
+          <p:cNvSpPr>
+            <a:spLocks noChangeShapeType="1"/>
+          </p:cNvSpPr>
+          <p:nvPr/>
+        </p:nvSpPr>
+        <p:spPr bwMode="auto">
+          <a:xfrm flipH="1" flipV="1">
+            <a:off x="3369253" y="3384836"/>
+            <a:ext cx="2231193" cy="6699"/>
+          </a:xfrm>
+          <a:prstGeom prst="line">
+            <a:avLst/>
+          </a:prstGeom>
+          <a:noFill/>
+          <a:ln w="19050">
+            <a:solidFill>
+              <a:schemeClr val="accent3">
+                <a:lumMod val="75000"/>
+              </a:schemeClr>
+            </a:solidFill>
+            <a:prstDash val="sysDash"/>
+            <a:round/>
+            <a:headEnd/>
+            <a:tailEnd type="triangle" w="lg" len="lg"/>
+          </a:ln>
+        </p:spPr>
+        <p:txBody>
+          <a:bodyPr/>
+          <a:lstStyle/>
+          <a:p>
+            <a:pPr defTabSz="872733"/>
+            <a:endParaRPr lang="en-US" sz="1500">
+              <a:solidFill>
+                <a:prstClr val="black"/>
+              </a:solidFill>
+            </a:endParaRPr>
+          </a:p>
+        </p:txBody>
+      </p:sp>
     </p:spTree>
     <p:extLst>
       <p:ext uri="{BB962C8B-B14F-4D97-AF65-F5344CB8AC3E}">

</xml_diff>

<commit_message>
Changes made to Edit.pptx
</commit_message>
<xml_diff>
--- a/docs/Edit.pptx
+++ b/docs/Edit.pptx
@@ -3836,9 +3836,9 @@
         <p:grpSpPr>
           <a:xfrm>
             <a:off x="228600" y="172946"/>
-            <a:ext cx="8469191" cy="6423218"/>
+            <a:ext cx="8469191" cy="6532652"/>
             <a:chOff x="117858" y="197507"/>
-            <a:chExt cx="8414026" cy="7622675"/>
+            <a:chExt cx="8414026" cy="7752545"/>
           </a:xfrm>
         </p:grpSpPr>
         <p:sp>
@@ -3851,8 +3851,8 @@
           </p:nvSpPr>
           <p:spPr bwMode="auto">
             <a:xfrm flipH="1">
-              <a:off x="717650" y="839833"/>
-              <a:ext cx="11119" cy="6567646"/>
+              <a:off x="712756" y="839834"/>
+              <a:ext cx="16013" cy="7110218"/>
             </a:xfrm>
             <a:prstGeom prst="line">
               <a:avLst/>
@@ -3975,7 +3975,7 @@
           <p:spPr>
             <a:xfrm>
               <a:off x="603890" y="1120110"/>
-              <a:ext cx="229013" cy="6130890"/>
+              <a:ext cx="235804" cy="6739515"/>
             </a:xfrm>
             <a:prstGeom prst="rect">
               <a:avLst/>

</xml_diff>